<commit_message>
added results of new test set to powerpoint sheet
</commit_message>
<xml_diff>
--- a/AI/AI_Results.pptx
+++ b/AI/AI_Results.pptx
@@ -1166,7 +1166,7 @@
         </p:nvSpPr>
         <p:spPr>
           <a:xfrm>
-            <a:off x="380209" y="957271"/>
+            <a:off x="273502" y="971733"/>
             <a:ext cx="4712804" cy="2471729"/>
           </a:xfrm>
           <a:prstGeom prst="rect">
@@ -1479,7 +1479,7 @@
         </p:nvSpPr>
         <p:spPr>
           <a:xfrm>
-            <a:off x="5006079" y="957271"/>
+            <a:off x="273502" y="4541775"/>
             <a:ext cx="4712804" cy="2471729"/>
           </a:xfrm>
           <a:prstGeom prst="rect">
@@ -1735,7 +1735,7 @@
         </p:nvSpPr>
         <p:spPr>
           <a:xfrm>
-            <a:off x="417062" y="3229651"/>
+            <a:off x="273502" y="3141427"/>
             <a:ext cx="4712804" cy="2427003"/>
           </a:xfrm>
           <a:prstGeom prst="rect">
@@ -1941,6 +1941,10 @@
               <a:buFont typeface="Arial" panose="020B0604020202020204" pitchFamily="34" charset="0"/>
               <a:buChar char="•"/>
             </a:pPr>
+            <a:r>
+              <a:rPr lang="nl-NL" dirty="0"/>
+              <a:t>Optimaliseren </a:t>
+            </a:r>
             <a:r>
               <a:rPr lang="nl-NL" dirty="0" err="1"/>
               <a:t>Accuracy</a:t>
@@ -1992,7 +1996,7 @@
         </p:blipFill>
         <p:spPr>
           <a:xfrm>
-            <a:off x="5135660" y="5122097"/>
+            <a:off x="5189415" y="3755727"/>
             <a:ext cx="6577608" cy="1687260"/>
           </a:xfrm>
           <a:prstGeom prst="rect">
@@ -2022,7 +2026,7 @@
         </p:blipFill>
         <p:spPr>
           <a:xfrm>
-            <a:off x="5006079" y="2403422"/>
+            <a:off x="5089356" y="1202671"/>
             <a:ext cx="2962688" cy="2553056"/>
           </a:xfrm>
           <a:prstGeom prst="rect">
@@ -2052,8 +2056,38 @@
         </p:blipFill>
         <p:spPr>
           <a:xfrm>
-            <a:off x="8735015" y="2390603"/>
+            <a:off x="8622996" y="1202671"/>
             <a:ext cx="3295502" cy="2553056"/>
+          </a:xfrm>
+          <a:prstGeom prst="rect">
+            <a:avLst/>
+          </a:prstGeom>
+        </p:spPr>
+      </p:pic>
+      <p:pic>
+        <p:nvPicPr>
+          <p:cNvPr id="8" name="Picture 7">
+            <a:extLst>
+              <a:ext uri="{FF2B5EF4-FFF2-40B4-BE49-F238E27FC236}">
+                <a16:creationId xmlns:a16="http://schemas.microsoft.com/office/drawing/2014/main" id="{4CF6690A-1136-1F76-1450-9FC0EC1A183D}"/>
+              </a:ext>
+            </a:extLst>
+          </p:cNvPr>
+          <p:cNvPicPr>
+            <a:picLocks noChangeAspect="1"/>
+          </p:cNvPicPr>
+          <p:nvPr/>
+        </p:nvPicPr>
+        <p:blipFill>
+          <a:blip r:embed="rId5"/>
+          <a:stretch>
+            <a:fillRect/>
+          </a:stretch>
+        </p:blipFill>
+        <p:spPr>
+          <a:xfrm>
+            <a:off x="5189415" y="5442987"/>
+            <a:ext cx="6539290" cy="1253252"/>
           </a:xfrm>
           <a:prstGeom prst="rect">
             <a:avLst/>
@@ -2482,15 +2516,6 @@
 </file>
 
 <file path=customXml/item2.xml><?xml version="1.0" encoding="utf-8"?>
-<?mso-contentType ?>
-<FormTemplates xmlns="http://schemas.microsoft.com/sharepoint/v3/contenttype/forms">
-  <Display>DocumentLibraryForm</Display>
-  <Edit>DocumentLibraryForm</Edit>
-  <New>DocumentLibraryForm</New>
-</FormTemplates>
-</file>
-
-<file path=customXml/item3.xml><?xml version="1.0" encoding="utf-8"?>
 <ct:contentTypeSchema xmlns:ct="http://schemas.microsoft.com/office/2006/metadata/contentType" xmlns:ma="http://schemas.microsoft.com/office/2006/metadata/properties/metaAttributes" ct:_="" ma:_="" ma:contentTypeName="Document" ma:contentTypeID="0x010100BF1551BE9D2837459D497D79EE019F1E" ma:contentTypeVersion="13" ma:contentTypeDescription="Een nieuw document maken." ma:contentTypeScope="" ma:versionID="401dfdc83791e196e02a2ef3834a8912">
   <xsd:schema xmlns:xsd="http://www.w3.org/2001/XMLSchema" xmlns:xs="http://www.w3.org/2001/XMLSchema" xmlns:p="http://schemas.microsoft.com/office/2006/metadata/properties" xmlns:ns2="81073326-ebee-4c0c-a26a-590ff4adfe90" xmlns:ns3="85fa55d4-3ee8-4bc4-8fbc-63473e847397" targetNamespace="http://schemas.microsoft.com/office/2006/metadata/properties" ma:root="true" ma:fieldsID="66b284ea29873edbb2d147766a6cb8e9" ns2:_="" ns3:_="">
     <xsd:import namespace="81073326-ebee-4c0c-a26a-590ff4adfe90"/>
@@ -2713,6 +2738,15 @@
 </ct:contentTypeSchema>
 </file>
 
+<file path=customXml/item3.xml><?xml version="1.0" encoding="utf-8"?>
+<?mso-contentType ?>
+<FormTemplates xmlns="http://schemas.microsoft.com/sharepoint/v3/contenttype/forms">
+  <Display>DocumentLibraryForm</Display>
+  <Edit>DocumentLibraryForm</Edit>
+  <New>DocumentLibraryForm</New>
+</FormTemplates>
+</file>
+
 <file path=customXml/itemProps1.xml><?xml version="1.0" encoding="utf-8"?>
 <ds:datastoreItem xmlns:ds="http://schemas.openxmlformats.org/officeDocument/2006/customXml" ds:itemID="{9B926128-5816-4FEE-9E96-1F6BAC84DAA4}">
   <ds:schemaRefs>
@@ -2723,14 +2757,6 @@
 </file>
 
 <file path=customXml/itemProps2.xml><?xml version="1.0" encoding="utf-8"?>
-<ds:datastoreItem xmlns:ds="http://schemas.openxmlformats.org/officeDocument/2006/customXml" ds:itemID="{43A0DF4B-5BF3-4EC0-A571-05E60EB7287D}">
-  <ds:schemaRefs>
-    <ds:schemaRef ds:uri="http://schemas.microsoft.com/sharepoint/v3/contenttype/forms"/>
-  </ds:schemaRefs>
-</ds:datastoreItem>
-</file>
-
-<file path=customXml/itemProps3.xml><?xml version="1.0" encoding="utf-8"?>
 <ds:datastoreItem xmlns:ds="http://schemas.openxmlformats.org/officeDocument/2006/customXml" ds:itemID="{A92CD673-2983-4FF4-8F72-F67B80471501}">
   <ds:schemaRefs>
     <ds:schemaRef ds:uri="http://schemas.microsoft.com/office/2006/metadata/contentType"/>
@@ -2747,4 +2773,12 @@
     <ds:schemaRef ds:uri="http://schemas.microsoft.com/internal/obd"/>
   </ds:schemaRefs>
 </ds:datastoreItem>
+</file>
+
+<file path=customXml/itemProps3.xml><?xml version="1.0" encoding="utf-8"?>
+<ds:datastoreItem xmlns:ds="http://schemas.openxmlformats.org/officeDocument/2006/customXml" ds:itemID="{43A0DF4B-5BF3-4EC0-A571-05E60EB7287D}">
+  <ds:schemaRefs>
+    <ds:schemaRef ds:uri="http://schemas.microsoft.com/sharepoint/v3/contenttype/forms"/>
+  </ds:schemaRefs>
+</ds:datastoreItem>
 </file>
</xml_diff>